<commit_message>
WIn 2024 update 2024-01-22
</commit_message>
<xml_diff>
--- a/CSE111W05TestingFunctions.pptx
+++ b/CSE111W05TestingFunctions.pptx
@@ -10,7 +10,7 @@
   <p:sldIdLst>
     <p:sldId id="256" r:id="rId2"/>
     <p:sldId id="265" r:id="rId3"/>
-    <p:sldId id="416" r:id="rId4"/>
+    <p:sldId id="427" r:id="rId4"/>
     <p:sldId id="269" r:id="rId5"/>
     <p:sldId id="266" r:id="rId6"/>
     <p:sldId id="270" r:id="rId7"/>
@@ -154,7 +154,7 @@
 <file path=ppt/revisionInfo.xml><?xml version="1.0" encoding="utf-8"?>
 <p1510:revInfo xmlns:a="http://schemas.openxmlformats.org/drawingml/2006/main" xmlns:r="http://schemas.openxmlformats.org/officeDocument/2006/relationships" xmlns:p1510="http://schemas.microsoft.com/office/powerpoint/2015/10/main">
   <p1510:revLst>
-    <p1510:client id="{18CCDFD3-266D-1A4C-80EE-F8AFC6907492}" v="41" dt="2023-05-02T18:21:37.512"/>
+    <p1510:client id="{96D0903E-DD99-3F46-B86E-F63FBCF3E220}" v="3" dt="2024-01-22T15:19:02.494"/>
   </p1510:revLst>
 </p1510:revInfo>
 </file>
@@ -174,6 +174,129 @@
           <pc:docMk/>
           <pc:sldMk cId="1555995004" sldId="416"/>
         </pc:sldMkLst>
+      </pc:sldChg>
+    </pc:docChg>
+  </pc:docChgLst>
+  <pc:docChgLst>
+    <pc:chgData name="Clements, William" userId="cbdb0636-a496-422a-8d40-98c53d494d26" providerId="ADAL" clId="{96D0903E-DD99-3F46-B86E-F63FBCF3E220}"/>
+    <pc:docChg chg="undo custSel addSld delSld modSld">
+      <pc:chgData name="Clements, William" userId="cbdb0636-a496-422a-8d40-98c53d494d26" providerId="ADAL" clId="{96D0903E-DD99-3F46-B86E-F63FBCF3E220}" dt="2024-01-22T15:19:21.253" v="23" actId="1076"/>
+      <pc:docMkLst>
+        <pc:docMk/>
+      </pc:docMkLst>
+      <pc:sldChg chg="modSp mod">
+        <pc:chgData name="Clements, William" userId="cbdb0636-a496-422a-8d40-98c53d494d26" providerId="ADAL" clId="{96D0903E-DD99-3F46-B86E-F63FBCF3E220}" dt="2024-01-22T15:18:39.716" v="16" actId="1076"/>
+        <pc:sldMkLst>
+          <pc:docMk/>
+          <pc:sldMk cId="4219362985" sldId="277"/>
+        </pc:sldMkLst>
+        <pc:spChg chg="mod">
+          <ac:chgData name="Clements, William" userId="cbdb0636-a496-422a-8d40-98c53d494d26" providerId="ADAL" clId="{96D0903E-DD99-3F46-B86E-F63FBCF3E220}" dt="2024-01-22T15:18:31.398" v="15" actId="20577"/>
+          <ac:spMkLst>
+            <pc:docMk/>
+            <pc:sldMk cId="4219362985" sldId="277"/>
+            <ac:spMk id="2" creationId="{EA90CAAC-623E-AEBD-FA8F-A47CE2B1F554}"/>
+          </ac:spMkLst>
+        </pc:spChg>
+        <pc:picChg chg="mod">
+          <ac:chgData name="Clements, William" userId="cbdb0636-a496-422a-8d40-98c53d494d26" providerId="ADAL" clId="{96D0903E-DD99-3F46-B86E-F63FBCF3E220}" dt="2024-01-22T15:18:39.716" v="16" actId="1076"/>
+          <ac:picMkLst>
+            <pc:docMk/>
+            <pc:sldMk cId="4219362985" sldId="277"/>
+            <ac:picMk id="7" creationId="{1AA136B8-8002-5CA8-00FC-B10EB02424ED}"/>
+          </ac:picMkLst>
+        </pc:picChg>
+      </pc:sldChg>
+      <pc:sldChg chg="modSp mod">
+        <pc:chgData name="Clements, William" userId="cbdb0636-a496-422a-8d40-98c53d494d26" providerId="ADAL" clId="{96D0903E-DD99-3F46-B86E-F63FBCF3E220}" dt="2024-01-22T15:18:42.224" v="17" actId="1076"/>
+        <pc:sldMkLst>
+          <pc:docMk/>
+          <pc:sldMk cId="2050069926" sldId="278"/>
+        </pc:sldMkLst>
+        <pc:picChg chg="mod">
+          <ac:chgData name="Clements, William" userId="cbdb0636-a496-422a-8d40-98c53d494d26" providerId="ADAL" clId="{96D0903E-DD99-3F46-B86E-F63FBCF3E220}" dt="2024-01-22T15:18:42.224" v="17" actId="1076"/>
+          <ac:picMkLst>
+            <pc:docMk/>
+            <pc:sldMk cId="2050069926" sldId="278"/>
+            <ac:picMk id="11" creationId="{8AC9523A-E93E-FE76-3B9C-40DF686D1177}"/>
+          </ac:picMkLst>
+        </pc:picChg>
+      </pc:sldChg>
+      <pc:sldChg chg="addSp modSp mod">
+        <pc:chgData name="Clements, William" userId="cbdb0636-a496-422a-8d40-98c53d494d26" providerId="ADAL" clId="{96D0903E-DD99-3F46-B86E-F63FBCF3E220}" dt="2024-01-22T15:19:21.253" v="23" actId="1076"/>
+        <pc:sldMkLst>
+          <pc:docMk/>
+          <pc:sldMk cId="1534853730" sldId="279"/>
+        </pc:sldMkLst>
+        <pc:picChg chg="add mod">
+          <ac:chgData name="Clements, William" userId="cbdb0636-a496-422a-8d40-98c53d494d26" providerId="ADAL" clId="{96D0903E-DD99-3F46-B86E-F63FBCF3E220}" dt="2024-01-22T15:19:21.253" v="23" actId="1076"/>
+          <ac:picMkLst>
+            <pc:docMk/>
+            <pc:sldMk cId="1534853730" sldId="279"/>
+            <ac:picMk id="6" creationId="{01098FD4-9431-35ED-24FA-333495789DA3}"/>
+          </ac:picMkLst>
+        </pc:picChg>
+        <pc:picChg chg="mod">
+          <ac:chgData name="Clements, William" userId="cbdb0636-a496-422a-8d40-98c53d494d26" providerId="ADAL" clId="{96D0903E-DD99-3F46-B86E-F63FBCF3E220}" dt="2024-01-22T15:19:17.188" v="22" actId="1076"/>
+          <ac:picMkLst>
+            <pc:docMk/>
+            <pc:sldMk cId="1534853730" sldId="279"/>
+            <ac:picMk id="7" creationId="{2E41AF3E-D16C-885A-6CD3-0C0D2FC9B220}"/>
+          </ac:picMkLst>
+        </pc:picChg>
+      </pc:sldChg>
+      <pc:sldChg chg="del">
+        <pc:chgData name="Clements, William" userId="cbdb0636-a496-422a-8d40-98c53d494d26" providerId="ADAL" clId="{96D0903E-DD99-3F46-B86E-F63FBCF3E220}" dt="2024-01-22T15:13:47.430" v="1" actId="2696"/>
+        <pc:sldMkLst>
+          <pc:docMk/>
+          <pc:sldMk cId="1555995004" sldId="416"/>
+        </pc:sldMkLst>
+      </pc:sldChg>
+      <pc:sldChg chg="addSp delSp modSp mod">
+        <pc:chgData name="Clements, William" userId="cbdb0636-a496-422a-8d40-98c53d494d26" providerId="ADAL" clId="{96D0903E-DD99-3F46-B86E-F63FBCF3E220}" dt="2024-01-22T15:15:59.141" v="13" actId="478"/>
+        <pc:sldMkLst>
+          <pc:docMk/>
+          <pc:sldMk cId="2924312798" sldId="426"/>
+        </pc:sldMkLst>
+        <pc:picChg chg="add del mod">
+          <ac:chgData name="Clements, William" userId="cbdb0636-a496-422a-8d40-98c53d494d26" providerId="ADAL" clId="{96D0903E-DD99-3F46-B86E-F63FBCF3E220}" dt="2024-01-22T15:15:46.044" v="8" actId="478"/>
+          <ac:picMkLst>
+            <pc:docMk/>
+            <pc:sldMk cId="2924312798" sldId="426"/>
+            <ac:picMk id="6" creationId="{A248DD26-5CDF-0B58-705F-C8EFB232B50D}"/>
+          </ac:picMkLst>
+        </pc:picChg>
+        <pc:picChg chg="add del mod">
+          <ac:chgData name="Clements, William" userId="cbdb0636-a496-422a-8d40-98c53d494d26" providerId="ADAL" clId="{96D0903E-DD99-3F46-B86E-F63FBCF3E220}" dt="2024-01-22T15:15:59.141" v="13" actId="478"/>
+          <ac:picMkLst>
+            <pc:docMk/>
+            <pc:sldMk cId="2924312798" sldId="426"/>
+            <ac:picMk id="8" creationId="{7D5BA19F-1B69-F8E6-0E94-CD6175F5F105}"/>
+          </ac:picMkLst>
+        </pc:picChg>
+        <pc:picChg chg="add del mod">
+          <ac:chgData name="Clements, William" userId="cbdb0636-a496-422a-8d40-98c53d494d26" providerId="ADAL" clId="{96D0903E-DD99-3F46-B86E-F63FBCF3E220}" dt="2024-01-22T15:15:53.389" v="11" actId="478"/>
+          <ac:picMkLst>
+            <pc:docMk/>
+            <pc:sldMk cId="2924312798" sldId="426"/>
+            <ac:picMk id="11" creationId="{9BC6D2DC-B5F1-199A-47AC-B5433858AAB2}"/>
+          </ac:picMkLst>
+        </pc:picChg>
+      </pc:sldChg>
+      <pc:sldChg chg="modSp add mod">
+        <pc:chgData name="Clements, William" userId="cbdb0636-a496-422a-8d40-98c53d494d26" providerId="ADAL" clId="{96D0903E-DD99-3F46-B86E-F63FBCF3E220}" dt="2024-01-22T15:13:54.218" v="4" actId="20577"/>
+        <pc:sldMkLst>
+          <pc:docMk/>
+          <pc:sldMk cId="3509787507" sldId="427"/>
+        </pc:sldMkLst>
+        <pc:spChg chg="mod">
+          <ac:chgData name="Clements, William" userId="cbdb0636-a496-422a-8d40-98c53d494d26" providerId="ADAL" clId="{96D0903E-DD99-3F46-B86E-F63FBCF3E220}" dt="2024-01-22T15:13:54.218" v="4" actId="20577"/>
+          <ac:spMkLst>
+            <pc:docMk/>
+            <pc:sldMk cId="3509787507" sldId="427"/>
+            <ac:spMk id="2" creationId="{5E77EDA3-E5D5-1651-3F69-E0B890F55A0A}"/>
+          </ac:spMkLst>
+        </pc:spChg>
       </pc:sldChg>
     </pc:docChg>
   </pc:docChgLst>
@@ -1660,7 +1783,7 @@
           <a:p>
             <a:fld id="{02690096-900F-ED42-827C-B9F9724501B3}" type="datetimeFigureOut">
               <a:rPr lang="en-US" smtClean="0"/>
-              <a:t>5/15/23</a:t>
+              <a:t>1/22/24</a:t>
             </a:fld>
             <a:endParaRPr lang="en-US"/>
           </a:p>
@@ -2226,7 +2349,7 @@
           <a:p>
             <a:fld id="{591ABA0C-7335-C849-B134-C4AE85641D98}" type="datetimeFigureOut">
               <a:rPr lang="en-US" smtClean="0"/>
-              <a:t>5/15/23</a:t>
+              <a:t>1/22/24</a:t>
             </a:fld>
             <a:endParaRPr lang="en-US"/>
           </a:p>
@@ -2396,7 +2519,7 @@
           <a:p>
             <a:fld id="{591ABA0C-7335-C849-B134-C4AE85641D98}" type="datetimeFigureOut">
               <a:rPr lang="en-US" smtClean="0"/>
-              <a:t>5/15/23</a:t>
+              <a:t>1/22/24</a:t>
             </a:fld>
             <a:endParaRPr lang="en-US"/>
           </a:p>
@@ -2576,7 +2699,7 @@
           <a:p>
             <a:fld id="{591ABA0C-7335-C849-B134-C4AE85641D98}" type="datetimeFigureOut">
               <a:rPr lang="en-US" smtClean="0"/>
-              <a:t>5/15/23</a:t>
+              <a:t>1/22/24</a:t>
             </a:fld>
             <a:endParaRPr lang="en-US"/>
           </a:p>
@@ -2746,7 +2869,7 @@
           <a:p>
             <a:fld id="{591ABA0C-7335-C849-B134-C4AE85641D98}" type="datetimeFigureOut">
               <a:rPr lang="en-US" smtClean="0"/>
-              <a:t>5/15/23</a:t>
+              <a:t>1/22/24</a:t>
             </a:fld>
             <a:endParaRPr lang="en-US"/>
           </a:p>
@@ -2992,7 +3115,7 @@
           <a:p>
             <a:fld id="{591ABA0C-7335-C849-B134-C4AE85641D98}" type="datetimeFigureOut">
               <a:rPr lang="en-US" smtClean="0"/>
-              <a:t>5/15/23</a:t>
+              <a:t>1/22/24</a:t>
             </a:fld>
             <a:endParaRPr lang="en-US"/>
           </a:p>
@@ -3224,7 +3347,7 @@
           <a:p>
             <a:fld id="{591ABA0C-7335-C849-B134-C4AE85641D98}" type="datetimeFigureOut">
               <a:rPr lang="en-US" smtClean="0"/>
-              <a:t>5/15/23</a:t>
+              <a:t>1/22/24</a:t>
             </a:fld>
             <a:endParaRPr lang="en-US"/>
           </a:p>
@@ -3591,7 +3714,7 @@
           <a:p>
             <a:fld id="{591ABA0C-7335-C849-B134-C4AE85641D98}" type="datetimeFigureOut">
               <a:rPr lang="en-US" smtClean="0"/>
-              <a:t>5/15/23</a:t>
+              <a:t>1/22/24</a:t>
             </a:fld>
             <a:endParaRPr lang="en-US"/>
           </a:p>
@@ -3709,7 +3832,7 @@
           <a:p>
             <a:fld id="{591ABA0C-7335-C849-B134-C4AE85641D98}" type="datetimeFigureOut">
               <a:rPr lang="en-US" smtClean="0"/>
-              <a:t>5/15/23</a:t>
+              <a:t>1/22/24</a:t>
             </a:fld>
             <a:endParaRPr lang="en-US"/>
           </a:p>
@@ -3804,7 +3927,7 @@
           <a:p>
             <a:fld id="{591ABA0C-7335-C849-B134-C4AE85641D98}" type="datetimeFigureOut">
               <a:rPr lang="en-US" smtClean="0"/>
-              <a:t>5/15/23</a:t>
+              <a:t>1/22/24</a:t>
             </a:fld>
             <a:endParaRPr lang="en-US"/>
           </a:p>
@@ -4081,7 +4204,7 @@
           <a:p>
             <a:fld id="{591ABA0C-7335-C849-B134-C4AE85641D98}" type="datetimeFigureOut">
               <a:rPr lang="en-US" smtClean="0"/>
-              <a:t>5/15/23</a:t>
+              <a:t>1/22/24</a:t>
             </a:fld>
             <a:endParaRPr lang="en-US"/>
           </a:p>
@@ -4338,7 +4461,7 @@
           <a:p>
             <a:fld id="{591ABA0C-7335-C849-B134-C4AE85641D98}" type="datetimeFigureOut">
               <a:rPr lang="en-US" smtClean="0"/>
-              <a:t>5/15/23</a:t>
+              <a:t>1/22/24</a:t>
             </a:fld>
             <a:endParaRPr lang="en-US"/>
           </a:p>
@@ -4551,7 +4674,7 @@
           <a:p>
             <a:fld id="{591ABA0C-7335-C849-B134-C4AE85641D98}" type="datetimeFigureOut">
               <a:rPr lang="en-US" smtClean="0"/>
-              <a:t>5/15/23</a:t>
+              <a:t>1/22/24</a:t>
             </a:fld>
             <a:endParaRPr lang="en-US"/>
           </a:p>
@@ -6388,6 +6511,9 @@
               <a:rPr lang="en-US" b="1" dirty="0"/>
               <a:t>05 Checkpoint: Testing Functions</a:t>
             </a:r>
+            <a:br>
+              <a:rPr lang="en-US" b="1" dirty="0"/>
+            </a:br>
             <a:endParaRPr lang="en-US" dirty="0"/>
           </a:p>
         </p:txBody>
@@ -6549,7 +6675,7 @@
         </p:blipFill>
         <p:spPr>
           <a:xfrm>
-            <a:off x="6096000" y="940919"/>
+            <a:off x="6279886" y="1143999"/>
             <a:ext cx="5912114" cy="5714001"/>
           </a:xfrm>
           <a:prstGeom prst="rect">
@@ -6781,7 +6907,7 @@
         </p:blipFill>
         <p:spPr>
           <a:xfrm>
-            <a:off x="6423949" y="1244964"/>
+            <a:off x="6596507" y="1387492"/>
             <a:ext cx="5595493" cy="5470508"/>
           </a:xfrm>
           <a:prstGeom prst="rect">
@@ -7962,8 +8088,38 @@
         </p:blipFill>
         <p:spPr>
           <a:xfrm>
-            <a:off x="6194427" y="1681163"/>
-            <a:ext cx="4430775" cy="4717118"/>
+            <a:off x="5918365" y="3068766"/>
+            <a:ext cx="2413582" cy="2569562"/>
+          </a:xfrm>
+          <a:prstGeom prst="rect">
+            <a:avLst/>
+          </a:prstGeom>
+        </p:spPr>
+      </p:pic>
+      <p:pic>
+        <p:nvPicPr>
+          <p:cNvPr id="6" name="Picture 5">
+            <a:extLst>
+              <a:ext uri="{FF2B5EF4-FFF2-40B4-BE49-F238E27FC236}">
+                <a16:creationId xmlns:a16="http://schemas.microsoft.com/office/drawing/2014/main" id="{01098FD4-9431-35ED-24FA-333495789DA3}"/>
+              </a:ext>
+            </a:extLst>
+          </p:cNvPr>
+          <p:cNvPicPr>
+            <a:picLocks noChangeAspect="1"/>
+          </p:cNvPicPr>
+          <p:nvPr/>
+        </p:nvPicPr>
+        <p:blipFill>
+          <a:blip r:embed="rId3"/>
+          <a:stretch>
+            <a:fillRect/>
+          </a:stretch>
+        </p:blipFill>
+        <p:spPr>
+          <a:xfrm>
+            <a:off x="8252736" y="2286753"/>
+            <a:ext cx="3939264" cy="3851274"/>
           </a:xfrm>
           <a:prstGeom prst="rect">
             <a:avLst/>
@@ -12450,7 +12606,7 @@
           <a:p>
             <a:r>
               <a:rPr lang="en-US" dirty="0"/>
-              <a:t>Preview of Projects</a:t>
+              <a:t>Preview of Projects </a:t>
             </a:r>
           </a:p>
         </p:txBody>
@@ -12487,10 +12643,10 @@
       </p:pic>
       <p:pic>
         <p:nvPicPr>
-          <p:cNvPr id="5" name="Picture 4">
-            <a:extLst>
-              <a:ext uri="{FF2B5EF4-FFF2-40B4-BE49-F238E27FC236}">
-                <a16:creationId xmlns:a16="http://schemas.microsoft.com/office/drawing/2014/main" id="{FACB71D5-204D-7777-8495-86D1D19A79CB}"/>
+          <p:cNvPr id="6" name="Picture 5">
+            <a:extLst>
+              <a:ext uri="{FF2B5EF4-FFF2-40B4-BE49-F238E27FC236}">
+                <a16:creationId xmlns:a16="http://schemas.microsoft.com/office/drawing/2014/main" id="{20DEB544-27F9-3F5A-32E7-27C1BD652B82}"/>
               </a:ext>
             </a:extLst>
           </p:cNvPr>
@@ -12507,8 +12663,8 @@
         </p:blipFill>
         <p:spPr>
           <a:xfrm>
-            <a:off x="158476" y="3690747"/>
-            <a:ext cx="3464969" cy="1434391"/>
+            <a:off x="354596" y="3185632"/>
+            <a:ext cx="3464969" cy="850009"/>
           </a:xfrm>
           <a:prstGeom prst="rect">
             <a:avLst/>
@@ -12537,7 +12693,7 @@
         </p:blipFill>
         <p:spPr>
           <a:xfrm>
-            <a:off x="4748495" y="5469613"/>
+            <a:off x="4700782" y="3000675"/>
             <a:ext cx="3464969" cy="671780"/>
           </a:xfrm>
           <a:prstGeom prst="rect">
@@ -12567,7 +12723,7 @@
         </p:blipFill>
         <p:spPr>
           <a:xfrm>
-            <a:off x="4748495" y="4144761"/>
+            <a:off x="4700782" y="1675823"/>
             <a:ext cx="3463664" cy="1253066"/>
           </a:xfrm>
           <a:prstGeom prst="rect">
@@ -12597,7 +12753,7 @@
         </p:blipFill>
         <p:spPr>
           <a:xfrm>
-            <a:off x="8362024" y="1366315"/>
+            <a:off x="4578832" y="4219806"/>
             <a:ext cx="3829976" cy="1924742"/>
           </a:xfrm>
           <a:prstGeom prst="rect">
@@ -12619,7 +12775,7 @@
         </p:nvSpPr>
         <p:spPr>
           <a:xfrm>
-            <a:off x="8605381" y="939452"/>
+            <a:off x="4822189" y="3792943"/>
             <a:ext cx="1734064" cy="369332"/>
           </a:xfrm>
           <a:prstGeom prst="rect">
@@ -12677,10 +12833,10 @@
       </p:sp>
       <p:sp>
         <p:nvSpPr>
-          <p:cNvPr id="13" name="TextBox 12">
-            <a:extLst>
-              <a:ext uri="{FF2B5EF4-FFF2-40B4-BE49-F238E27FC236}">
-                <a16:creationId xmlns:a16="http://schemas.microsoft.com/office/drawing/2014/main" id="{8F2BB399-F8AE-BCE3-B4FF-70C28E435C33}"/>
+          <p:cNvPr id="14" name="TextBox 13">
+            <a:extLst>
+              <a:ext uri="{FF2B5EF4-FFF2-40B4-BE49-F238E27FC236}">
+                <a16:creationId xmlns:a16="http://schemas.microsoft.com/office/drawing/2014/main" id="{398147F4-FCEB-B4A0-491F-5E08446E77D8}"/>
               </a:ext>
             </a:extLst>
           </p:cNvPr>
@@ -12689,8 +12845,8 @@
         </p:nvSpPr>
         <p:spPr>
           <a:xfrm>
-            <a:off x="120522" y="2537668"/>
-            <a:ext cx="1694695" cy="369332"/>
+            <a:off x="1190177" y="2790082"/>
+            <a:ext cx="1899623" cy="369332"/>
           </a:xfrm>
           <a:prstGeom prst="rect">
             <a:avLst/>
@@ -12705,17 +12861,17 @@
           <a:p>
             <a:r>
               <a:rPr lang="en-US" dirty="0"/>
-              <a:t>Picture Program</a:t>
-            </a:r>
-          </a:p>
-        </p:txBody>
-      </p:sp>
-      <p:sp>
-        <p:nvSpPr>
-          <p:cNvPr id="14" name="TextBox 13">
-            <a:extLst>
-              <a:ext uri="{FF2B5EF4-FFF2-40B4-BE49-F238E27FC236}">
-                <a16:creationId xmlns:a16="http://schemas.microsoft.com/office/drawing/2014/main" id="{398147F4-FCEB-B4A0-491F-5E08446E77D8}"/>
+              <a:t>Sentence Program</a:t>
+            </a:r>
+          </a:p>
+        </p:txBody>
+      </p:sp>
+      <p:sp>
+        <p:nvSpPr>
+          <p:cNvPr id="15" name="TextBox 14">
+            <a:extLst>
+              <a:ext uri="{FF2B5EF4-FFF2-40B4-BE49-F238E27FC236}">
+                <a16:creationId xmlns:a16="http://schemas.microsoft.com/office/drawing/2014/main" id="{7778780A-2295-CCC4-4D34-9C5B92AD6FD7}"/>
               </a:ext>
             </a:extLst>
           </p:cNvPr>
@@ -12724,8 +12880,8 @@
         </p:nvSpPr>
         <p:spPr>
           <a:xfrm>
-            <a:off x="979576" y="3337976"/>
-            <a:ext cx="1899623" cy="369332"/>
+            <a:off x="4776998" y="1247479"/>
+            <a:ext cx="1981376" cy="369332"/>
           </a:xfrm>
           <a:prstGeom prst="rect">
             <a:avLst/>
@@ -12740,17 +12896,17 @@
           <a:p>
             <a:r>
               <a:rPr lang="en-US" dirty="0"/>
-              <a:t>Sentence Program</a:t>
-            </a:r>
-          </a:p>
-        </p:txBody>
-      </p:sp>
-      <p:sp>
-        <p:nvSpPr>
-          <p:cNvPr id="15" name="TextBox 14">
-            <a:extLst>
-              <a:ext uri="{FF2B5EF4-FFF2-40B4-BE49-F238E27FC236}">
-                <a16:creationId xmlns:a16="http://schemas.microsoft.com/office/drawing/2014/main" id="{7778780A-2295-CCC4-4D34-9C5B92AD6FD7}"/>
+              <a:t>Chemistry Program</a:t>
+            </a:r>
+          </a:p>
+        </p:txBody>
+      </p:sp>
+      <p:sp>
+        <p:nvSpPr>
+          <p:cNvPr id="17" name="TextBox 16">
+            <a:extLst>
+              <a:ext uri="{FF2B5EF4-FFF2-40B4-BE49-F238E27FC236}">
+                <a16:creationId xmlns:a16="http://schemas.microsoft.com/office/drawing/2014/main" id="{CB563610-FDFA-47E7-E4E4-D04F62E6634A}"/>
               </a:ext>
             </a:extLst>
           </p:cNvPr>
@@ -12759,8 +12915,8 @@
         </p:nvSpPr>
         <p:spPr>
           <a:xfrm>
-            <a:off x="4824711" y="3716417"/>
-            <a:ext cx="1981376" cy="369332"/>
+            <a:off x="8614997" y="3901083"/>
+            <a:ext cx="3066719" cy="369332"/>
           </a:xfrm>
           <a:prstGeom prst="rect">
             <a:avLst/>
@@ -12768,24 +12924,24 @@
           <a:noFill/>
         </p:spPr>
         <p:txBody>
-          <a:bodyPr wrap="none" rtlCol="0">
+          <a:bodyPr wrap="square">
             <a:spAutoFit/>
           </a:bodyPr>
           <a:lstStyle/>
           <a:p>
             <a:r>
-              <a:rPr lang="en-US" dirty="0"/>
-              <a:t>Chemistry Program</a:t>
-            </a:r>
-          </a:p>
-        </p:txBody>
-      </p:sp>
-      <p:sp>
-        <p:nvSpPr>
-          <p:cNvPr id="17" name="TextBox 16">
-            <a:extLst>
-              <a:ext uri="{FF2B5EF4-FFF2-40B4-BE49-F238E27FC236}">
-                <a16:creationId xmlns:a16="http://schemas.microsoft.com/office/drawing/2014/main" id="{CB563610-FDFA-47E7-E4E4-D04F62E6634A}"/>
+              <a:rPr lang="en-US" b="1" dirty="0"/>
+              <a:t>Student Chosen Program</a:t>
+            </a:r>
+          </a:p>
+        </p:txBody>
+      </p:sp>
+      <p:sp>
+        <p:nvSpPr>
+          <p:cNvPr id="19" name="TextBox 18">
+            <a:extLst>
+              <a:ext uri="{FF2B5EF4-FFF2-40B4-BE49-F238E27FC236}">
+                <a16:creationId xmlns:a16="http://schemas.microsoft.com/office/drawing/2014/main" id="{4C4749F1-CA77-F656-C692-98AC0EFBDA7E}"/>
               </a:ext>
             </a:extLst>
           </p:cNvPr>
@@ -12794,8 +12950,8 @@
         </p:nvSpPr>
         <p:spPr>
           <a:xfrm>
-            <a:off x="8614997" y="3901083"/>
-            <a:ext cx="3066719" cy="369332"/>
+            <a:off x="8536112" y="4185906"/>
+            <a:ext cx="2817688" cy="369332"/>
           </a:xfrm>
           <a:prstGeom prst="rect">
             <a:avLst/>
@@ -12809,18 +12965,18 @@
           <a:lstStyle/>
           <a:p>
             <a:r>
-              <a:rPr lang="en-US" b="1" dirty="0"/>
-              <a:t>Student Chosen Program</a:t>
-            </a:r>
-          </a:p>
-        </p:txBody>
-      </p:sp>
-      <p:sp>
-        <p:nvSpPr>
-          <p:cNvPr id="19" name="TextBox 18">
-            <a:extLst>
-              <a:ext uri="{FF2B5EF4-FFF2-40B4-BE49-F238E27FC236}">
-                <a16:creationId xmlns:a16="http://schemas.microsoft.com/office/drawing/2014/main" id="{4C4749F1-CA77-F656-C692-98AC0EFBDA7E}"/>
+              <a:rPr lang="en-US" dirty="0"/>
+              <a:t>solves a real-world problem</a:t>
+            </a:r>
+          </a:p>
+        </p:txBody>
+      </p:sp>
+      <p:sp>
+        <p:nvSpPr>
+          <p:cNvPr id="21" name="TextBox 20">
+            <a:extLst>
+              <a:ext uri="{FF2B5EF4-FFF2-40B4-BE49-F238E27FC236}">
+                <a16:creationId xmlns:a16="http://schemas.microsoft.com/office/drawing/2014/main" id="{95F03798-F168-3541-6B48-BEB1866C79B0}"/>
               </a:ext>
             </a:extLst>
           </p:cNvPr>
@@ -12829,8 +12985,8 @@
         </p:nvSpPr>
         <p:spPr>
           <a:xfrm>
-            <a:off x="8536112" y="4185906"/>
-            <a:ext cx="2817688" cy="369332"/>
+            <a:off x="8488794" y="4446385"/>
+            <a:ext cx="3757231" cy="369332"/>
           </a:xfrm>
           <a:prstGeom prst="rect">
             <a:avLst/>
@@ -12845,17 +13001,17 @@
           <a:p>
             <a:r>
               <a:rPr lang="en-US" dirty="0"/>
-              <a:t>solves a real-world problem</a:t>
-            </a:r>
-          </a:p>
-        </p:txBody>
-      </p:sp>
-      <p:sp>
-        <p:nvSpPr>
-          <p:cNvPr id="21" name="TextBox 20">
-            <a:extLst>
-              <a:ext uri="{FF2B5EF4-FFF2-40B4-BE49-F238E27FC236}">
-                <a16:creationId xmlns:a16="http://schemas.microsoft.com/office/drawing/2014/main" id="{95F03798-F168-3541-6B48-BEB1866C79B0}"/>
+              <a:t>useful in your major or hobby.</a:t>
+            </a:r>
+          </a:p>
+        </p:txBody>
+      </p:sp>
+      <p:sp>
+        <p:nvSpPr>
+          <p:cNvPr id="23" name="TextBox 22">
+            <a:extLst>
+              <a:ext uri="{FF2B5EF4-FFF2-40B4-BE49-F238E27FC236}">
+                <a16:creationId xmlns:a16="http://schemas.microsoft.com/office/drawing/2014/main" id="{C9074852-C2F8-42B6-DB00-0B01F84DC352}"/>
               </a:ext>
             </a:extLst>
           </p:cNvPr>
@@ -12864,8 +13020,8 @@
         </p:nvSpPr>
         <p:spPr>
           <a:xfrm>
-            <a:off x="8488794" y="4446385"/>
-            <a:ext cx="3757231" cy="369332"/>
+            <a:off x="8784404" y="5007948"/>
+            <a:ext cx="2897312" cy="923330"/>
           </a:xfrm>
           <a:prstGeom prst="rect">
             <a:avLst/>
@@ -12879,200 +13035,199 @@
           <a:lstStyle/>
           <a:p>
             <a:r>
-              <a:rPr lang="en-US" dirty="0"/>
-              <a:t>useful in your major or hobby.</a:t>
-            </a:r>
-          </a:p>
-        </p:txBody>
-      </p:sp>
-      <p:sp>
-        <p:nvSpPr>
-          <p:cNvPr id="23" name="TextBox 22">
-            <a:extLst>
-              <a:ext uri="{FF2B5EF4-FFF2-40B4-BE49-F238E27FC236}">
-                <a16:creationId xmlns:a16="http://schemas.microsoft.com/office/drawing/2014/main" id="{C9074852-C2F8-42B6-DB00-0B01F84DC352}"/>
-              </a:ext>
-            </a:extLst>
-          </p:cNvPr>
-          <p:cNvSpPr txBox="1"/>
+              <a:rPr lang="en-US" dirty="0">
+                <a:hlinkClick r:id="rId7"/>
+              </a:rPr>
+              <a:t>https://byui-cse.github.io/cse111-course/lesson11/prove.html</a:t>
+            </a:r>
+            <a:r>
+              <a:rPr lang="en-US" dirty="0"/>
+              <a:t> </a:t>
+            </a:r>
+          </a:p>
+        </p:txBody>
+      </p:sp>
+      <p:pic>
+        <p:nvPicPr>
+          <p:cNvPr id="3" name="Picture 2" descr="A diagram of a city water distribution system that stores&#10;        water in an elevated tank">
+            <a:extLst>
+              <a:ext uri="{FF2B5EF4-FFF2-40B4-BE49-F238E27FC236}">
+                <a16:creationId xmlns:a16="http://schemas.microsoft.com/office/drawing/2014/main" id="{8249F22E-77F6-038F-4908-67EB85E05A57}"/>
+              </a:ext>
+            </a:extLst>
+          </p:cNvPr>
+          <p:cNvPicPr>
+            <a:picLocks noChangeAspect="1" noChangeArrowheads="1"/>
+          </p:cNvPicPr>
           <p:nvPr/>
-        </p:nvSpPr>
-        <p:spPr>
+        </p:nvPicPr>
+        <p:blipFill>
+          <a:blip r:embed="rId8">
+            <a:extLst>
+              <a:ext uri="{28A0092B-C50C-407E-A947-70E740481C1C}">
+                <a14:useLocalDpi xmlns:a14="http://schemas.microsoft.com/office/drawing/2010/main" val="0"/>
+              </a:ext>
+            </a:extLst>
+          </a:blip>
+          <a:srcRect/>
+          <a:stretch>
+            <a:fillRect/>
+          </a:stretch>
+        </p:blipFill>
+        <p:spPr bwMode="auto">
           <a:xfrm>
-            <a:off x="8784404" y="5007948"/>
-            <a:ext cx="2897312" cy="923330"/>
+            <a:off x="705895" y="4944650"/>
+            <a:ext cx="2762371" cy="1438735"/>
           </a:xfrm>
           <a:prstGeom prst="rect">
             <a:avLst/>
           </a:prstGeom>
           <a:noFill/>
-        </p:spPr>
-        <p:txBody>
-          <a:bodyPr wrap="square">
+          <a:extLst>
+            <a:ext uri="{909E8E84-426E-40DD-AFC4-6F175D3DCCD1}">
+              <a14:hiddenFill xmlns:a14="http://schemas.microsoft.com/office/drawing/2010/main">
+                <a:solidFill>
+                  <a:srgbClr val="FFFFFF"/>
+                </a:solidFill>
+              </a14:hiddenFill>
+            </a:ext>
+          </a:extLst>
+        </p:spPr>
+      </p:pic>
+      <p:sp>
+        <p:nvSpPr>
+          <p:cNvPr id="10" name="TextBox 9">
+            <a:extLst>
+              <a:ext uri="{FF2B5EF4-FFF2-40B4-BE49-F238E27FC236}">
+                <a16:creationId xmlns:a16="http://schemas.microsoft.com/office/drawing/2014/main" id="{26F85C6D-D16B-9FFD-F026-3FBEAC05AF14}"/>
+              </a:ext>
+            </a:extLst>
+          </p:cNvPr>
+          <p:cNvSpPr txBox="1"/>
+          <p:nvPr/>
+        </p:nvSpPr>
+        <p:spPr>
+          <a:xfrm>
+            <a:off x="892618" y="4488278"/>
+            <a:ext cx="2772297" cy="369332"/>
+          </a:xfrm>
+          <a:prstGeom prst="rect">
+            <a:avLst/>
+          </a:prstGeom>
+          <a:noFill/>
+        </p:spPr>
+        <p:txBody>
+          <a:bodyPr wrap="none" rtlCol="0">
             <a:spAutoFit/>
           </a:bodyPr>
           <a:lstStyle/>
           <a:p>
             <a:r>
-              <a:rPr lang="en-US" dirty="0">
-                <a:hlinkClick r:id="rId7"/>
-              </a:rPr>
-              <a:t>https://byui-cse.github.io/cse111-course/lesson11/prove.html</a:t>
-            </a:r>
-            <a:r>
-              <a:rPr lang="en-US" dirty="0"/>
-              <a:t> </a:t>
-            </a:r>
-          </a:p>
-        </p:txBody>
-      </p:sp>
-      <p:grpSp>
-        <p:nvGrpSpPr>
-          <p:cNvPr id="22" name="Group 21">
-            <a:extLst>
-              <a:ext uri="{FF2B5EF4-FFF2-40B4-BE49-F238E27FC236}">
-                <a16:creationId xmlns:a16="http://schemas.microsoft.com/office/drawing/2014/main" id="{7C1D56BB-F691-6866-761A-9523662D3093}"/>
-              </a:ext>
-            </a:extLst>
-          </p:cNvPr>
-          <p:cNvGrpSpPr/>
+              <a:rPr lang="en-US" dirty="0"/>
+              <a:t>Water Distribution Program</a:t>
+            </a:r>
+          </a:p>
+        </p:txBody>
+      </p:sp>
+      <p:sp>
+        <p:nvSpPr>
+          <p:cNvPr id="16" name="TextBox 15">
+            <a:extLst>
+              <a:ext uri="{FF2B5EF4-FFF2-40B4-BE49-F238E27FC236}">
+                <a16:creationId xmlns:a16="http://schemas.microsoft.com/office/drawing/2014/main" id="{3026A790-64DD-B14E-6869-60E81C3112C2}"/>
+              </a:ext>
+            </a:extLst>
+          </p:cNvPr>
+          <p:cNvSpPr txBox="1"/>
           <p:nvPr/>
-        </p:nvGrpSpPr>
-        <p:grpSpPr>
+        </p:nvSpPr>
+        <p:spPr>
           <a:xfrm>
-            <a:off x="8212159" y="5926136"/>
-            <a:ext cx="2127286" cy="782309"/>
-            <a:chOff x="5208872" y="2574534"/>
-            <a:chExt cx="3644900" cy="1308100"/>
-          </a:xfrm>
-        </p:grpSpPr>
-        <p:pic>
-          <p:nvPicPr>
-            <p:cNvPr id="24" name="Picture 23">
-              <a:extLst>
-                <a:ext uri="{FF2B5EF4-FFF2-40B4-BE49-F238E27FC236}">
-                  <a16:creationId xmlns:a16="http://schemas.microsoft.com/office/drawing/2014/main" id="{72D82BA8-23D2-686F-9581-8F758F8B4967}"/>
-                </a:ext>
-              </a:extLst>
-            </p:cNvPr>
-            <p:cNvPicPr>
-              <a:picLocks noChangeAspect="1"/>
-            </p:cNvPicPr>
-            <p:nvPr/>
-          </p:nvPicPr>
-          <p:blipFill>
-            <a:blip r:embed="rId8"/>
-            <a:stretch>
-              <a:fillRect/>
-            </a:stretch>
-          </p:blipFill>
-          <p:spPr>
-            <a:xfrm>
-              <a:off x="5208872" y="2574534"/>
-              <a:ext cx="3644900" cy="1308100"/>
-            </a:xfrm>
-            <a:prstGeom prst="rect">
-              <a:avLst/>
-            </a:prstGeom>
-          </p:spPr>
-        </p:pic>
-        <p:sp>
-          <p:nvSpPr>
-            <p:cNvPr id="25" name="Rectangle 24">
-              <a:extLst>
-                <a:ext uri="{FF2B5EF4-FFF2-40B4-BE49-F238E27FC236}">
-                  <a16:creationId xmlns:a16="http://schemas.microsoft.com/office/drawing/2014/main" id="{D15F0D58-2257-66E3-90B7-4693F74A0E17}"/>
-                </a:ext>
-              </a:extLst>
-            </p:cNvPr>
-            <p:cNvSpPr/>
-            <p:nvPr/>
-          </p:nvSpPr>
-          <p:spPr>
-            <a:xfrm>
-              <a:off x="7602876" y="3092521"/>
-              <a:ext cx="544531" cy="246580"/>
-            </a:xfrm>
-            <a:prstGeom prst="rect">
-              <a:avLst/>
-            </a:prstGeom>
-          </p:spPr>
-          <p:style>
-            <a:lnRef idx="2">
-              <a:schemeClr val="accent1">
-                <a:shade val="50000"/>
-              </a:schemeClr>
-            </a:lnRef>
-            <a:fillRef idx="1">
-              <a:schemeClr val="accent1"/>
-            </a:fillRef>
-            <a:effectRef idx="0">
-              <a:schemeClr val="accent1"/>
-            </a:effectRef>
-            <a:fontRef idx="minor">
-              <a:schemeClr val="lt1"/>
-            </a:fontRef>
-          </p:style>
-          <p:txBody>
-            <a:bodyPr rtlCol="0" anchor="ctr"/>
-            <a:lstStyle/>
-            <a:p>
-              <a:pPr algn="ctr"/>
-              <a:endParaRPr lang="en-US"/>
-            </a:p>
-          </p:txBody>
-        </p:sp>
-        <p:sp>
-          <p:nvSpPr>
-            <p:cNvPr id="26" name="Rectangle 25">
-              <a:extLst>
-                <a:ext uri="{FF2B5EF4-FFF2-40B4-BE49-F238E27FC236}">
-                  <a16:creationId xmlns:a16="http://schemas.microsoft.com/office/drawing/2014/main" id="{624165A1-DAC7-4289-C76C-9D13866EEA07}"/>
-                </a:ext>
-              </a:extLst>
-            </p:cNvPr>
-            <p:cNvSpPr/>
-            <p:nvPr/>
-          </p:nvSpPr>
-          <p:spPr>
-            <a:xfrm>
-              <a:off x="8192364" y="3092521"/>
-              <a:ext cx="544531" cy="246580"/>
-            </a:xfrm>
-            <a:prstGeom prst="rect">
-              <a:avLst/>
-            </a:prstGeom>
-          </p:spPr>
-          <p:style>
-            <a:lnRef idx="2">
-              <a:schemeClr val="accent1">
-                <a:shade val="50000"/>
-              </a:schemeClr>
-            </a:lnRef>
-            <a:fillRef idx="1">
-              <a:schemeClr val="accent1"/>
-            </a:fillRef>
-            <a:effectRef idx="0">
-              <a:schemeClr val="accent1"/>
-            </a:effectRef>
-            <a:fontRef idx="minor">
-              <a:schemeClr val="lt1"/>
-            </a:fontRef>
-          </p:style>
-          <p:txBody>
-            <a:bodyPr rtlCol="0" anchor="ctr"/>
-            <a:lstStyle/>
-            <a:p>
-              <a:pPr algn="ctr"/>
-              <a:endParaRPr lang="en-US"/>
-            </a:p>
-          </p:txBody>
-        </p:sp>
-      </p:grpSp>
+            <a:off x="8958933" y="1120294"/>
+            <a:ext cx="3007042" cy="369332"/>
+          </a:xfrm>
+          <a:prstGeom prst="rect">
+            <a:avLst/>
+          </a:prstGeom>
+          <a:noFill/>
+        </p:spPr>
+        <p:txBody>
+          <a:bodyPr wrap="none" rtlCol="0">
+            <a:spAutoFit/>
+          </a:bodyPr>
+          <a:lstStyle/>
+          <a:p>
+            <a:r>
+              <a:rPr lang="en-US" dirty="0"/>
+              <a:t>Heart Rate &amp; Physics Equation</a:t>
+            </a:r>
+          </a:p>
+        </p:txBody>
+      </p:sp>
+      <p:pic>
+        <p:nvPicPr>
+          <p:cNvPr id="18" name="Picture 17">
+            <a:extLst>
+              <a:ext uri="{FF2B5EF4-FFF2-40B4-BE49-F238E27FC236}">
+                <a16:creationId xmlns:a16="http://schemas.microsoft.com/office/drawing/2014/main" id="{A80675E6-EB97-119A-688D-8AB75F4DC97D}"/>
+              </a:ext>
+            </a:extLst>
+          </p:cNvPr>
+          <p:cNvPicPr>
+            <a:picLocks noChangeAspect="1"/>
+          </p:cNvPicPr>
+          <p:nvPr/>
+        </p:nvPicPr>
+        <p:blipFill>
+          <a:blip r:embed="rId9"/>
+          <a:stretch>
+            <a:fillRect/>
+          </a:stretch>
+        </p:blipFill>
+        <p:spPr>
+          <a:xfrm>
+            <a:off x="9148868" y="1499124"/>
+            <a:ext cx="2238132" cy="803232"/>
+          </a:xfrm>
+          <a:prstGeom prst="rect">
+            <a:avLst/>
+          </a:prstGeom>
+        </p:spPr>
+      </p:pic>
+      <p:pic>
+        <p:nvPicPr>
+          <p:cNvPr id="20" name="Picture 19">
+            <a:extLst>
+              <a:ext uri="{FF2B5EF4-FFF2-40B4-BE49-F238E27FC236}">
+                <a16:creationId xmlns:a16="http://schemas.microsoft.com/office/drawing/2014/main" id="{F538C03E-5F15-32B0-5937-995B8EE5FF6F}"/>
+              </a:ext>
+            </a:extLst>
+          </p:cNvPr>
+          <p:cNvPicPr>
+            <a:picLocks noChangeAspect="1"/>
+          </p:cNvPicPr>
+          <p:nvPr/>
+        </p:nvPicPr>
+        <p:blipFill>
+          <a:blip r:embed="rId10"/>
+          <a:stretch>
+            <a:fillRect/>
+          </a:stretch>
+        </p:blipFill>
+        <p:spPr>
+          <a:xfrm>
+            <a:off x="9084713" y="2579455"/>
+            <a:ext cx="2398278" cy="858023"/>
+          </a:xfrm>
+          <a:prstGeom prst="rect">
+            <a:avLst/>
+          </a:prstGeom>
+        </p:spPr>
+      </p:pic>
     </p:spTree>
     <p:extLst>
       <p:ext uri="{BB962C8B-B14F-4D97-AF65-F5344CB8AC3E}">
-        <p14:creationId xmlns:p14="http://schemas.microsoft.com/office/powerpoint/2010/main" val="1555995004"/>
+        <p14:creationId xmlns:p14="http://schemas.microsoft.com/office/powerpoint/2010/main" val="3509787507"/>
       </p:ext>
     </p:extLst>
   </p:cSld>

</xml_diff>